<commit_message>
SLD-63: Add ChartEx.XValues property
</commit_message>
<xml_diff>
--- a/src/SlideDotNet.Tests/Resource/024.pptx
+++ b/src/SlideDotNet.Tests/Resource/024.pptx
@@ -6,23 +6,24 @@
     <p:sldMasterId id="2147483732" r:id="rId6"/>
   </p:sldMasterIdLst>
   <p:notesMasterIdLst>
-    <p:notesMasterId r:id="rId8"/>
+    <p:notesMasterId r:id="rId9"/>
   </p:notesMasterIdLst>
   <p:handoutMasterIdLst>
-    <p:handoutMasterId r:id="rId9"/>
+    <p:handoutMasterId r:id="rId10"/>
   </p:handoutMasterIdLst>
   <p:sldIdLst>
     <p:sldId id="481" r:id="rId7"/>
+    <p:sldId id="482" r:id="rId8"/>
   </p:sldIdLst>
   <p:sldSz cx="9144000" cy="6858000" type="screen4x3"/>
   <p:notesSz cx="6797675" cy="9928225"/>
   <p:embeddedFontLst>
     <p:embeddedFont>
       <p:font typeface="Calibri" panose="020F0502020204030204" pitchFamily="34" charset="0"/>
-      <p:regular r:id="rId10"/>
-      <p:bold r:id="rId11"/>
-      <p:italic r:id="rId12"/>
-      <p:boldItalic r:id="rId13"/>
+      <p:regular r:id="rId11"/>
+      <p:bold r:id="rId12"/>
+      <p:italic r:id="rId13"/>
+      <p:boldItalic r:id="rId14"/>
     </p:embeddedFont>
   </p:embeddedFontLst>
   <p:defaultTextStyle>
@@ -244,6 +245,868 @@
 </p:cmAuthorLst>
 </file>
 
+<file path=ppt/charts/chart1.xml><?xml version="1.0" encoding="utf-8"?>
+<c:chartSpace xmlns:c="http://schemas.openxmlformats.org/drawingml/2006/chart" xmlns:a="http://schemas.openxmlformats.org/drawingml/2006/main" xmlns:r="http://schemas.openxmlformats.org/officeDocument/2006/relationships" xmlns:c16r2="http://schemas.microsoft.com/office/drawing/2015/06/chart">
+  <c:date1904 val="0"/>
+  <c:lang val="ru-RU"/>
+  <c:roundedCorners val="0"/>
+  <mc:AlternateContent xmlns:mc="http://schemas.openxmlformats.org/markup-compatibility/2006">
+    <mc:Choice xmlns:c14="http://schemas.microsoft.com/office/drawing/2007/8/2/chart" Requires="c14">
+      <c14:style val="102"/>
+    </mc:Choice>
+    <mc:Fallback>
+      <c:style val="2"/>
+    </mc:Fallback>
+  </mc:AlternateContent>
+  <c:chart>
+    <c:title>
+      <c:overlay val="0"/>
+      <c:spPr>
+        <a:noFill/>
+        <a:ln>
+          <a:noFill/>
+        </a:ln>
+        <a:effectLst/>
+      </c:spPr>
+      <c:txPr>
+        <a:bodyPr rot="0" spcFirstLastPara="1" vertOverflow="ellipsis" vert="horz" wrap="square" anchor="ctr" anchorCtr="1"/>
+        <a:lstStyle/>
+        <a:p>
+          <a:pPr>
+            <a:defRPr sz="1862" b="0" i="0" u="none" strike="noStrike" kern="1200" spc="0" baseline="0">
+              <a:solidFill>
+                <a:schemeClr val="tx1">
+                  <a:lumMod val="65000"/>
+                  <a:lumOff val="35000"/>
+                </a:schemeClr>
+              </a:solidFill>
+              <a:latin typeface="+mn-lt"/>
+              <a:ea typeface="+mn-ea"/>
+              <a:cs typeface="+mn-cs"/>
+            </a:defRPr>
+          </a:pPr>
+          <a:endParaRPr lang="ru-UA"/>
+        </a:p>
+      </c:txPr>
+    </c:title>
+    <c:autoTitleDeleted val="0"/>
+    <c:plotArea>
+      <c:layout/>
+      <c:scatterChart>
+        <c:scatterStyle val="lineMarker"/>
+        <c:varyColors val="0"/>
+        <c:ser>
+          <c:idx val="0"/>
+          <c:order val="0"/>
+          <c:tx>
+            <c:strRef>
+              <c:f>Лист1!$B$1</c:f>
+              <c:strCache>
+                <c:ptCount val="1"/>
+                <c:pt idx="0">
+                  <c:v>Значения Y</c:v>
+                </c:pt>
+              </c:strCache>
+            </c:strRef>
+          </c:tx>
+          <c:spPr>
+            <a:ln w="28575" cap="rnd">
+              <a:noFill/>
+              <a:round/>
+            </a:ln>
+            <a:effectLst/>
+          </c:spPr>
+          <c:marker>
+            <c:symbol val="circle"/>
+            <c:size val="5"/>
+            <c:spPr>
+              <a:solidFill>
+                <a:schemeClr val="accent1"/>
+              </a:solidFill>
+              <a:ln w="9525">
+                <a:solidFill>
+                  <a:schemeClr val="accent1"/>
+                </a:solidFill>
+              </a:ln>
+              <a:effectLst/>
+            </c:spPr>
+          </c:marker>
+          <c:xVal>
+            <c:numRef>
+              <c:f>Лист1!$A$2:$A$4</c:f>
+              <c:numCache>
+                <c:formatCode>General</c:formatCode>
+                <c:ptCount val="3"/>
+                <c:pt idx="0">
+                  <c:v>10</c:v>
+                </c:pt>
+                <c:pt idx="1">
+                  <c:v>20</c:v>
+                </c:pt>
+                <c:pt idx="2">
+                  <c:v>30</c:v>
+                </c:pt>
+              </c:numCache>
+            </c:numRef>
+          </c:xVal>
+          <c:yVal>
+            <c:numRef>
+              <c:f>Лист1!$B$2:$B$4</c:f>
+              <c:numCache>
+                <c:formatCode>General</c:formatCode>
+                <c:ptCount val="3"/>
+                <c:pt idx="0">
+                  <c:v>5</c:v>
+                </c:pt>
+                <c:pt idx="1">
+                  <c:v>10</c:v>
+                </c:pt>
+                <c:pt idx="2">
+                  <c:v>15</c:v>
+                </c:pt>
+              </c:numCache>
+            </c:numRef>
+          </c:yVal>
+          <c:smooth val="0"/>
+          <c:extLst>
+            <c:ext xmlns:c16="http://schemas.microsoft.com/office/drawing/2014/chart" uri="{C3380CC4-5D6E-409C-BE32-E72D297353CC}">
+              <c16:uniqueId val="{00000000-6A07-47BE-91A4-204EF6833D27}"/>
+            </c:ext>
+          </c:extLst>
+        </c:ser>
+        <c:dLbls>
+          <c:showLegendKey val="0"/>
+          <c:showVal val="0"/>
+          <c:showCatName val="0"/>
+          <c:showSerName val="0"/>
+          <c:showPercent val="0"/>
+          <c:showBubbleSize val="0"/>
+        </c:dLbls>
+        <c:axId val="824769951"/>
+        <c:axId val="978218127"/>
+      </c:scatterChart>
+      <c:valAx>
+        <c:axId val="824769951"/>
+        <c:scaling>
+          <c:orientation val="minMax"/>
+        </c:scaling>
+        <c:delete val="0"/>
+        <c:axPos val="b"/>
+        <c:majorGridlines>
+          <c:spPr>
+            <a:ln w="9525" cap="flat" cmpd="sng" algn="ctr">
+              <a:solidFill>
+                <a:schemeClr val="tx1">
+                  <a:lumMod val="15000"/>
+                  <a:lumOff val="85000"/>
+                </a:schemeClr>
+              </a:solidFill>
+              <a:round/>
+            </a:ln>
+            <a:effectLst/>
+          </c:spPr>
+        </c:majorGridlines>
+        <c:numFmt formatCode="General" sourceLinked="1"/>
+        <c:majorTickMark val="none"/>
+        <c:minorTickMark val="none"/>
+        <c:tickLblPos val="nextTo"/>
+        <c:spPr>
+          <a:noFill/>
+          <a:ln w="9525" cap="flat" cmpd="sng" algn="ctr">
+            <a:solidFill>
+              <a:schemeClr val="tx1">
+                <a:lumMod val="25000"/>
+                <a:lumOff val="75000"/>
+              </a:schemeClr>
+            </a:solidFill>
+            <a:round/>
+          </a:ln>
+          <a:effectLst/>
+        </c:spPr>
+        <c:txPr>
+          <a:bodyPr rot="-60000000" spcFirstLastPara="1" vertOverflow="ellipsis" vert="horz" wrap="square" anchor="ctr" anchorCtr="1"/>
+          <a:lstStyle/>
+          <a:p>
+            <a:pPr>
+              <a:defRPr sz="1197" b="0" i="0" u="none" strike="noStrike" kern="1200" baseline="0">
+                <a:solidFill>
+                  <a:schemeClr val="tx1">
+                    <a:lumMod val="65000"/>
+                    <a:lumOff val="35000"/>
+                  </a:schemeClr>
+                </a:solidFill>
+                <a:latin typeface="+mn-lt"/>
+                <a:ea typeface="+mn-ea"/>
+                <a:cs typeface="+mn-cs"/>
+              </a:defRPr>
+            </a:pPr>
+            <a:endParaRPr lang="ru-UA"/>
+          </a:p>
+        </c:txPr>
+        <c:crossAx val="978218127"/>
+        <c:crosses val="autoZero"/>
+        <c:crossBetween val="midCat"/>
+      </c:valAx>
+      <c:valAx>
+        <c:axId val="978218127"/>
+        <c:scaling>
+          <c:orientation val="minMax"/>
+        </c:scaling>
+        <c:delete val="0"/>
+        <c:axPos val="l"/>
+        <c:majorGridlines>
+          <c:spPr>
+            <a:ln w="9525" cap="flat" cmpd="sng" algn="ctr">
+              <a:solidFill>
+                <a:schemeClr val="tx1">
+                  <a:lumMod val="15000"/>
+                  <a:lumOff val="85000"/>
+                </a:schemeClr>
+              </a:solidFill>
+              <a:round/>
+            </a:ln>
+            <a:effectLst/>
+          </c:spPr>
+        </c:majorGridlines>
+        <c:numFmt formatCode="General" sourceLinked="1"/>
+        <c:majorTickMark val="none"/>
+        <c:minorTickMark val="none"/>
+        <c:tickLblPos val="nextTo"/>
+        <c:spPr>
+          <a:noFill/>
+          <a:ln w="9525" cap="flat" cmpd="sng" algn="ctr">
+            <a:solidFill>
+              <a:schemeClr val="tx1">
+                <a:lumMod val="25000"/>
+                <a:lumOff val="75000"/>
+              </a:schemeClr>
+            </a:solidFill>
+            <a:round/>
+          </a:ln>
+          <a:effectLst/>
+        </c:spPr>
+        <c:txPr>
+          <a:bodyPr rot="-60000000" spcFirstLastPara="1" vertOverflow="ellipsis" vert="horz" wrap="square" anchor="ctr" anchorCtr="1"/>
+          <a:lstStyle/>
+          <a:p>
+            <a:pPr>
+              <a:defRPr sz="1197" b="0" i="0" u="none" strike="noStrike" kern="1200" baseline="0">
+                <a:solidFill>
+                  <a:schemeClr val="tx1">
+                    <a:lumMod val="65000"/>
+                    <a:lumOff val="35000"/>
+                  </a:schemeClr>
+                </a:solidFill>
+                <a:latin typeface="+mn-lt"/>
+                <a:ea typeface="+mn-ea"/>
+                <a:cs typeface="+mn-cs"/>
+              </a:defRPr>
+            </a:pPr>
+            <a:endParaRPr lang="ru-UA"/>
+          </a:p>
+        </c:txPr>
+        <c:crossAx val="824769951"/>
+        <c:crosses val="autoZero"/>
+        <c:crossBetween val="midCat"/>
+      </c:valAx>
+      <c:spPr>
+        <a:noFill/>
+        <a:ln>
+          <a:noFill/>
+        </a:ln>
+        <a:effectLst/>
+      </c:spPr>
+    </c:plotArea>
+    <c:plotVisOnly val="1"/>
+    <c:dispBlanksAs val="gap"/>
+    <c:extLst>
+      <c:ext xmlns:c16r3="http://schemas.microsoft.com/office/drawing/2017/03/chart" uri="{56B9EC1D-385E-4148-901F-78D8002777C0}">
+        <c16r3:dataDisplayOptions16>
+          <c16r3:dispNaAsBlank val="1"/>
+        </c16r3:dataDisplayOptions16>
+      </c:ext>
+    </c:extLst>
+    <c:showDLblsOverMax val="0"/>
+  </c:chart>
+  <c:spPr>
+    <a:noFill/>
+    <a:ln>
+      <a:noFill/>
+    </a:ln>
+    <a:effectLst/>
+  </c:spPr>
+  <c:txPr>
+    <a:bodyPr/>
+    <a:lstStyle/>
+    <a:p>
+      <a:pPr>
+        <a:defRPr/>
+      </a:pPr>
+      <a:endParaRPr lang="ru-UA"/>
+    </a:p>
+  </c:txPr>
+  <c:externalData r:id="rId3">
+    <c:autoUpdate val="0"/>
+  </c:externalData>
+</c:chartSpace>
+</file>
+
+<file path=ppt/charts/colors1.xml><?xml version="1.0" encoding="utf-8"?>
+<cs:colorStyle xmlns:cs="http://schemas.microsoft.com/office/drawing/2012/chartStyle" xmlns:a="http://schemas.openxmlformats.org/drawingml/2006/main" meth="cycle" id="10">
+  <a:schemeClr val="accent1"/>
+  <a:schemeClr val="accent2"/>
+  <a:schemeClr val="accent3"/>
+  <a:schemeClr val="accent4"/>
+  <a:schemeClr val="accent5"/>
+  <a:schemeClr val="accent6"/>
+  <cs:variation/>
+  <cs:variation>
+    <a:lumMod val="60000"/>
+  </cs:variation>
+  <cs:variation>
+    <a:lumMod val="80000"/>
+    <a:lumOff val="20000"/>
+  </cs:variation>
+  <cs:variation>
+    <a:lumMod val="80000"/>
+  </cs:variation>
+  <cs:variation>
+    <a:lumMod val="60000"/>
+    <a:lumOff val="40000"/>
+  </cs:variation>
+  <cs:variation>
+    <a:lumMod val="50000"/>
+  </cs:variation>
+  <cs:variation>
+    <a:lumMod val="70000"/>
+    <a:lumOff val="30000"/>
+  </cs:variation>
+  <cs:variation>
+    <a:lumMod val="70000"/>
+  </cs:variation>
+  <cs:variation>
+    <a:lumMod val="50000"/>
+    <a:lumOff val="50000"/>
+  </cs:variation>
+</cs:colorStyle>
+</file>
+
+<file path=ppt/charts/style1.xml><?xml version="1.0" encoding="utf-8"?>
+<cs:chartStyle xmlns:cs="http://schemas.microsoft.com/office/drawing/2012/chartStyle" xmlns:a="http://schemas.openxmlformats.org/drawingml/2006/main" id="240">
+  <cs:axisTitle>
+    <cs:lnRef idx="0"/>
+    <cs:fillRef idx="0"/>
+    <cs:effectRef idx="0"/>
+    <cs:fontRef idx="minor">
+      <a:schemeClr val="tx1">
+        <a:lumMod val="65000"/>
+        <a:lumOff val="35000"/>
+      </a:schemeClr>
+    </cs:fontRef>
+    <cs:defRPr sz="1330" kern="1200"/>
+  </cs:axisTitle>
+  <cs:categoryAxis>
+    <cs:lnRef idx="0"/>
+    <cs:fillRef idx="0"/>
+    <cs:effectRef idx="0"/>
+    <cs:fontRef idx="minor">
+      <a:schemeClr val="tx1">
+        <a:lumMod val="65000"/>
+        <a:lumOff val="35000"/>
+      </a:schemeClr>
+    </cs:fontRef>
+    <cs:spPr>
+      <a:ln w="9525" cap="flat" cmpd="sng" algn="ctr">
+        <a:solidFill>
+          <a:schemeClr val="tx1">
+            <a:lumMod val="25000"/>
+            <a:lumOff val="75000"/>
+          </a:schemeClr>
+        </a:solidFill>
+        <a:round/>
+      </a:ln>
+    </cs:spPr>
+    <cs:defRPr sz="1197" kern="1200"/>
+  </cs:categoryAxis>
+  <cs:chartArea mods="allowNoFillOverride allowNoLineOverride">
+    <cs:lnRef idx="0"/>
+    <cs:fillRef idx="0"/>
+    <cs:effectRef idx="0"/>
+    <cs:fontRef idx="minor">
+      <a:schemeClr val="tx1"/>
+    </cs:fontRef>
+    <cs:spPr>
+      <a:solidFill>
+        <a:schemeClr val="bg1"/>
+      </a:solidFill>
+      <a:ln w="9525" cap="flat" cmpd="sng" algn="ctr">
+        <a:solidFill>
+          <a:schemeClr val="tx1">
+            <a:lumMod val="15000"/>
+            <a:lumOff val="85000"/>
+          </a:schemeClr>
+        </a:solidFill>
+        <a:round/>
+      </a:ln>
+    </cs:spPr>
+    <cs:defRPr sz="1330" kern="1200"/>
+  </cs:chartArea>
+  <cs:dataLabel>
+    <cs:lnRef idx="0"/>
+    <cs:fillRef idx="0"/>
+    <cs:effectRef idx="0"/>
+    <cs:fontRef idx="minor">
+      <a:schemeClr val="tx1">
+        <a:lumMod val="75000"/>
+        <a:lumOff val="25000"/>
+      </a:schemeClr>
+    </cs:fontRef>
+    <cs:defRPr sz="1197" kern="1200"/>
+  </cs:dataLabel>
+  <cs:dataLabelCallout>
+    <cs:lnRef idx="0"/>
+    <cs:fillRef idx="0"/>
+    <cs:effectRef idx="0"/>
+    <cs:fontRef idx="minor">
+      <a:schemeClr val="dk1">
+        <a:lumMod val="65000"/>
+        <a:lumOff val="35000"/>
+      </a:schemeClr>
+    </cs:fontRef>
+    <cs:spPr>
+      <a:solidFill>
+        <a:schemeClr val="lt1"/>
+      </a:solidFill>
+      <a:ln>
+        <a:solidFill>
+          <a:schemeClr val="dk1">
+            <a:lumMod val="25000"/>
+            <a:lumOff val="75000"/>
+          </a:schemeClr>
+        </a:solidFill>
+      </a:ln>
+    </cs:spPr>
+    <cs:defRPr sz="1197" kern="1200"/>
+    <cs:bodyPr rot="0" spcFirstLastPara="1" vertOverflow="clip" horzOverflow="clip" vert="horz" wrap="square" lIns="36576" tIns="18288" rIns="36576" bIns="18288" anchor="ctr" anchorCtr="1">
+      <a:spAutoFit/>
+    </cs:bodyPr>
+  </cs:dataLabelCallout>
+  <cs:dataPoint>
+    <cs:lnRef idx="0"/>
+    <cs:fillRef idx="1">
+      <cs:styleClr val="auto"/>
+    </cs:fillRef>
+    <cs:effectRef idx="0"/>
+    <cs:fontRef idx="minor">
+      <a:schemeClr val="tx1"/>
+    </cs:fontRef>
+  </cs:dataPoint>
+  <cs:dataPoint3D>
+    <cs:lnRef idx="0"/>
+    <cs:fillRef idx="1">
+      <cs:styleClr val="auto"/>
+    </cs:fillRef>
+    <cs:effectRef idx="0"/>
+    <cs:fontRef idx="minor">
+      <a:schemeClr val="tx1"/>
+    </cs:fontRef>
+  </cs:dataPoint3D>
+  <cs:dataPointLine>
+    <cs:lnRef idx="0">
+      <cs:styleClr val="auto"/>
+    </cs:lnRef>
+    <cs:fillRef idx="1"/>
+    <cs:effectRef idx="0"/>
+    <cs:fontRef idx="minor">
+      <a:schemeClr val="tx1"/>
+    </cs:fontRef>
+    <cs:spPr>
+      <a:ln w="19050" cap="rnd">
+        <a:solidFill>
+          <a:schemeClr val="phClr"/>
+        </a:solidFill>
+        <a:round/>
+      </a:ln>
+    </cs:spPr>
+  </cs:dataPointLine>
+  <cs:dataPointMarker>
+    <cs:lnRef idx="0">
+      <cs:styleClr val="auto"/>
+    </cs:lnRef>
+    <cs:fillRef idx="1">
+      <cs:styleClr val="auto"/>
+    </cs:fillRef>
+    <cs:effectRef idx="0"/>
+    <cs:fontRef idx="minor">
+      <a:schemeClr val="tx1"/>
+    </cs:fontRef>
+    <cs:spPr>
+      <a:ln w="9525">
+        <a:solidFill>
+          <a:schemeClr val="phClr"/>
+        </a:solidFill>
+      </a:ln>
+    </cs:spPr>
+  </cs:dataPointMarker>
+  <cs:dataPointMarkerLayout symbol="circle" size="5"/>
+  <cs:dataPointWireframe>
+    <cs:lnRef idx="0">
+      <cs:styleClr val="auto"/>
+    </cs:lnRef>
+    <cs:fillRef idx="0"/>
+    <cs:effectRef idx="0"/>
+    <cs:fontRef idx="minor">
+      <a:schemeClr val="dk1"/>
+    </cs:fontRef>
+    <cs:spPr>
+      <a:ln w="9525" cap="rnd">
+        <a:solidFill>
+          <a:schemeClr val="phClr"/>
+        </a:solidFill>
+        <a:round/>
+      </a:ln>
+    </cs:spPr>
+  </cs:dataPointWireframe>
+  <cs:dataTable>
+    <cs:lnRef idx="0"/>
+    <cs:fillRef idx="0"/>
+    <cs:effectRef idx="0"/>
+    <cs:fontRef idx="minor">
+      <a:schemeClr val="tx1">
+        <a:lumMod val="65000"/>
+        <a:lumOff val="35000"/>
+      </a:schemeClr>
+    </cs:fontRef>
+    <cs:spPr>
+      <a:noFill/>
+      <a:ln w="9525" cap="flat" cmpd="sng" algn="ctr">
+        <a:solidFill>
+          <a:schemeClr val="tx1">
+            <a:lumMod val="15000"/>
+            <a:lumOff val="85000"/>
+          </a:schemeClr>
+        </a:solidFill>
+        <a:round/>
+      </a:ln>
+    </cs:spPr>
+    <cs:defRPr sz="1197" kern="1200"/>
+  </cs:dataTable>
+  <cs:downBar>
+    <cs:lnRef idx="0"/>
+    <cs:fillRef idx="0"/>
+    <cs:effectRef idx="0"/>
+    <cs:fontRef idx="minor">
+      <a:schemeClr val="tx1"/>
+    </cs:fontRef>
+    <cs:spPr>
+      <a:solidFill>
+        <a:schemeClr val="dk1">
+          <a:lumMod val="75000"/>
+          <a:lumOff val="25000"/>
+        </a:schemeClr>
+      </a:solidFill>
+      <a:ln w="9525" cap="flat" cmpd="sng" algn="ctr">
+        <a:solidFill>
+          <a:schemeClr val="tx1">
+            <a:lumMod val="65000"/>
+            <a:lumOff val="35000"/>
+          </a:schemeClr>
+        </a:solidFill>
+        <a:round/>
+      </a:ln>
+    </cs:spPr>
+  </cs:downBar>
+  <cs:dropLine>
+    <cs:lnRef idx="0"/>
+    <cs:fillRef idx="0"/>
+    <cs:effectRef idx="0"/>
+    <cs:fontRef idx="minor">
+      <a:schemeClr val="tx1"/>
+    </cs:fontRef>
+    <cs:spPr>
+      <a:ln w="9525" cap="flat" cmpd="sng" algn="ctr">
+        <a:solidFill>
+          <a:schemeClr val="tx1">
+            <a:lumMod val="35000"/>
+            <a:lumOff val="65000"/>
+          </a:schemeClr>
+        </a:solidFill>
+        <a:round/>
+      </a:ln>
+    </cs:spPr>
+  </cs:dropLine>
+  <cs:errorBar>
+    <cs:lnRef idx="0"/>
+    <cs:fillRef idx="0"/>
+    <cs:effectRef idx="0"/>
+    <cs:fontRef idx="minor">
+      <a:schemeClr val="tx1"/>
+    </cs:fontRef>
+    <cs:spPr>
+      <a:ln w="9525" cap="flat" cmpd="sng" algn="ctr">
+        <a:solidFill>
+          <a:schemeClr val="tx1">
+            <a:lumMod val="65000"/>
+            <a:lumOff val="35000"/>
+          </a:schemeClr>
+        </a:solidFill>
+        <a:round/>
+      </a:ln>
+    </cs:spPr>
+  </cs:errorBar>
+  <cs:floor>
+    <cs:lnRef idx="0"/>
+    <cs:fillRef idx="0"/>
+    <cs:effectRef idx="0"/>
+    <cs:fontRef idx="minor">
+      <a:schemeClr val="tx1"/>
+    </cs:fontRef>
+    <cs:spPr>
+      <a:noFill/>
+      <a:ln>
+        <a:noFill/>
+      </a:ln>
+    </cs:spPr>
+  </cs:floor>
+  <cs:gridlineMajor>
+    <cs:lnRef idx="0"/>
+    <cs:fillRef idx="0"/>
+    <cs:effectRef idx="0"/>
+    <cs:fontRef idx="minor">
+      <a:schemeClr val="tx1"/>
+    </cs:fontRef>
+    <cs:spPr>
+      <a:ln w="9525" cap="flat" cmpd="sng" algn="ctr">
+        <a:solidFill>
+          <a:schemeClr val="tx1">
+            <a:lumMod val="15000"/>
+            <a:lumOff val="85000"/>
+          </a:schemeClr>
+        </a:solidFill>
+        <a:round/>
+      </a:ln>
+    </cs:spPr>
+  </cs:gridlineMajor>
+  <cs:gridlineMinor>
+    <cs:lnRef idx="0"/>
+    <cs:fillRef idx="0"/>
+    <cs:effectRef idx="0"/>
+    <cs:fontRef idx="minor">
+      <a:schemeClr val="tx1"/>
+    </cs:fontRef>
+    <cs:spPr>
+      <a:ln w="9525" cap="flat" cmpd="sng" algn="ctr">
+        <a:solidFill>
+          <a:schemeClr val="tx1">
+            <a:lumMod val="5000"/>
+            <a:lumOff val="95000"/>
+          </a:schemeClr>
+        </a:solidFill>
+        <a:round/>
+      </a:ln>
+    </cs:spPr>
+  </cs:gridlineMinor>
+  <cs:hiLoLine>
+    <cs:lnRef idx="0"/>
+    <cs:fillRef idx="0"/>
+    <cs:effectRef idx="0"/>
+    <cs:fontRef idx="minor">
+      <a:schemeClr val="tx1"/>
+    </cs:fontRef>
+    <cs:spPr>
+      <a:ln w="9525" cap="flat" cmpd="sng" algn="ctr">
+        <a:solidFill>
+          <a:schemeClr val="tx1">
+            <a:lumMod val="50000"/>
+            <a:lumOff val="50000"/>
+          </a:schemeClr>
+        </a:solidFill>
+        <a:round/>
+      </a:ln>
+    </cs:spPr>
+  </cs:hiLoLine>
+  <cs:leaderLine>
+    <cs:lnRef idx="0"/>
+    <cs:fillRef idx="0"/>
+    <cs:effectRef idx="0"/>
+    <cs:fontRef idx="minor">
+      <a:schemeClr val="tx1"/>
+    </cs:fontRef>
+    <cs:spPr>
+      <a:ln w="9525" cap="flat" cmpd="sng" algn="ctr">
+        <a:solidFill>
+          <a:schemeClr val="tx1">
+            <a:lumMod val="35000"/>
+            <a:lumOff val="65000"/>
+          </a:schemeClr>
+        </a:solidFill>
+        <a:round/>
+      </a:ln>
+    </cs:spPr>
+  </cs:leaderLine>
+  <cs:legend>
+    <cs:lnRef idx="0"/>
+    <cs:fillRef idx="0"/>
+    <cs:effectRef idx="0"/>
+    <cs:fontRef idx="minor">
+      <a:schemeClr val="tx1">
+        <a:lumMod val="65000"/>
+        <a:lumOff val="35000"/>
+      </a:schemeClr>
+    </cs:fontRef>
+    <cs:defRPr sz="1197" kern="1200"/>
+  </cs:legend>
+  <cs:plotArea mods="allowNoFillOverride allowNoLineOverride">
+    <cs:lnRef idx="0"/>
+    <cs:fillRef idx="0"/>
+    <cs:effectRef idx="0"/>
+    <cs:fontRef idx="minor">
+      <a:schemeClr val="tx1"/>
+    </cs:fontRef>
+  </cs:plotArea>
+  <cs:plotArea3D mods="allowNoFillOverride allowNoLineOverride">
+    <cs:lnRef idx="0"/>
+    <cs:fillRef idx="0"/>
+    <cs:effectRef idx="0"/>
+    <cs:fontRef idx="minor">
+      <a:schemeClr val="tx1"/>
+    </cs:fontRef>
+  </cs:plotArea3D>
+  <cs:seriesAxis>
+    <cs:lnRef idx="0"/>
+    <cs:fillRef idx="0"/>
+    <cs:effectRef idx="0"/>
+    <cs:fontRef idx="minor">
+      <a:schemeClr val="tx1">
+        <a:lumMod val="65000"/>
+        <a:lumOff val="35000"/>
+      </a:schemeClr>
+    </cs:fontRef>
+    <cs:defRPr sz="1197" kern="1200"/>
+  </cs:seriesAxis>
+  <cs:seriesLine>
+    <cs:lnRef idx="0"/>
+    <cs:fillRef idx="0"/>
+    <cs:effectRef idx="0"/>
+    <cs:fontRef idx="minor">
+      <a:schemeClr val="tx1"/>
+    </cs:fontRef>
+    <cs:spPr>
+      <a:ln w="9525" cap="flat" cmpd="sng" algn="ctr">
+        <a:solidFill>
+          <a:schemeClr val="tx1">
+            <a:lumMod val="35000"/>
+            <a:lumOff val="65000"/>
+          </a:schemeClr>
+        </a:solidFill>
+        <a:round/>
+      </a:ln>
+    </cs:spPr>
+  </cs:seriesLine>
+  <cs:title>
+    <cs:lnRef idx="0"/>
+    <cs:fillRef idx="0"/>
+    <cs:effectRef idx="0"/>
+    <cs:fontRef idx="minor">
+      <a:schemeClr val="tx1">
+        <a:lumMod val="65000"/>
+        <a:lumOff val="35000"/>
+      </a:schemeClr>
+    </cs:fontRef>
+    <cs:defRPr sz="1862" b="0" kern="1200" spc="0" baseline="0"/>
+  </cs:title>
+  <cs:trendline>
+    <cs:lnRef idx="0">
+      <cs:styleClr val="auto"/>
+    </cs:lnRef>
+    <cs:fillRef idx="0"/>
+    <cs:effectRef idx="0"/>
+    <cs:fontRef idx="minor">
+      <a:schemeClr val="tx1"/>
+    </cs:fontRef>
+    <cs:spPr>
+      <a:ln w="19050" cap="rnd">
+        <a:solidFill>
+          <a:schemeClr val="phClr"/>
+        </a:solidFill>
+        <a:prstDash val="sysDot"/>
+      </a:ln>
+    </cs:spPr>
+  </cs:trendline>
+  <cs:trendlineLabel>
+    <cs:lnRef idx="0"/>
+    <cs:fillRef idx="0"/>
+    <cs:effectRef idx="0"/>
+    <cs:fontRef idx="minor">
+      <a:schemeClr val="tx1">
+        <a:lumMod val="65000"/>
+        <a:lumOff val="35000"/>
+      </a:schemeClr>
+    </cs:fontRef>
+    <cs:defRPr sz="1197" kern="1200"/>
+  </cs:trendlineLabel>
+  <cs:upBar>
+    <cs:lnRef idx="0"/>
+    <cs:fillRef idx="0"/>
+    <cs:effectRef idx="0"/>
+    <cs:fontRef idx="minor">
+      <a:schemeClr val="tx1"/>
+    </cs:fontRef>
+    <cs:spPr>
+      <a:solidFill>
+        <a:schemeClr val="lt1"/>
+      </a:solidFill>
+      <a:ln w="9525" cap="flat" cmpd="sng" algn="ctr">
+        <a:solidFill>
+          <a:schemeClr val="tx1">
+            <a:lumMod val="65000"/>
+            <a:lumOff val="35000"/>
+          </a:schemeClr>
+        </a:solidFill>
+        <a:round/>
+      </a:ln>
+    </cs:spPr>
+  </cs:upBar>
+  <cs:valueAxis>
+    <cs:lnRef idx="0"/>
+    <cs:fillRef idx="0"/>
+    <cs:effectRef idx="0"/>
+    <cs:fontRef idx="minor">
+      <a:schemeClr val="tx1">
+        <a:lumMod val="65000"/>
+        <a:lumOff val="35000"/>
+      </a:schemeClr>
+    </cs:fontRef>
+    <cs:spPr>
+      <a:ln w="9525" cap="flat" cmpd="sng" algn="ctr">
+        <a:solidFill>
+          <a:schemeClr val="tx1">
+            <a:lumMod val="25000"/>
+            <a:lumOff val="75000"/>
+          </a:schemeClr>
+        </a:solidFill>
+        <a:round/>
+      </a:ln>
+    </cs:spPr>
+    <cs:defRPr sz="1197" kern="1200"/>
+  </cs:valueAxis>
+  <cs:wall>
+    <cs:lnRef idx="0"/>
+    <cs:fillRef idx="0"/>
+    <cs:effectRef idx="0"/>
+    <cs:fontRef idx="minor">
+      <a:schemeClr val="tx1"/>
+    </cs:fontRef>
+    <cs:spPr>
+      <a:noFill/>
+      <a:ln>
+        <a:noFill/>
+      </a:ln>
+    </cs:spPr>
+  </cs:wall>
+</cs:chartStyle>
+</file>
+
 <file path=ppt/handoutMasters/handoutMaster1.xml><?xml version="1.0" encoding="utf-8"?>
 <p:handoutMaster xmlns:a="http://schemas.openxmlformats.org/drawingml/2006/main" xmlns:r="http://schemas.openxmlformats.org/officeDocument/2006/relationships" xmlns:p="http://schemas.openxmlformats.org/presentationml/2006/main">
   <p:cSld>
@@ -351,7 +1214,7 @@
               <a:pPr>
                 <a:defRPr/>
               </a:pPr>
-              <a:t>05.04.2020</a:t>
+              <a:t>11.04.2020</a:t>
             </a:fld>
             <a:endParaRPr lang="ru-RU" dirty="0"/>
           </a:p>
@@ -566,7 +1429,7 @@
               <a:pPr>
                 <a:defRPr/>
               </a:pPr>
-              <a:t>05.04.2020</a:t>
+              <a:t>11.04.2020</a:t>
             </a:fld>
             <a:endParaRPr lang="ru-RU" dirty="0"/>
           </a:p>
@@ -36836,6 +37699,67 @@
 </p:sld>
 </file>
 
+<file path=ppt/slides/slide2.xml><?xml version="1.0" encoding="utf-8"?>
+<p:sld xmlns:a="http://schemas.openxmlformats.org/drawingml/2006/main" xmlns:r="http://schemas.openxmlformats.org/officeDocument/2006/relationships" xmlns:p="http://schemas.openxmlformats.org/presentationml/2006/main">
+  <p:cSld>
+    <p:spTree>
+      <p:nvGrpSpPr>
+        <p:cNvPr id="1" name=""/>
+        <p:cNvGrpSpPr/>
+        <p:nvPr/>
+      </p:nvGrpSpPr>
+      <p:grpSpPr>
+        <a:xfrm>
+          <a:off x="0" y="0"/>
+          <a:ext cx="0" cy="0"/>
+          <a:chOff x="0" y="0"/>
+          <a:chExt cx="0" cy="0"/>
+        </a:xfrm>
+      </p:grpSpPr>
+      <p:graphicFrame>
+        <p:nvGraphicFramePr>
+          <p:cNvPr id="5" name="Диаграмма 4">
+            <a:extLst>
+              <a:ext uri="{FF2B5EF4-FFF2-40B4-BE49-F238E27FC236}">
+                <a16:creationId xmlns:a16="http://schemas.microsoft.com/office/drawing/2014/main" id="{36E82A1C-A820-408D-9674-ECFBEA6E3A7B}"/>
+              </a:ext>
+            </a:extLst>
+          </p:cNvPr>
+          <p:cNvGraphicFramePr/>
+          <p:nvPr>
+            <p:extLst>
+              <p:ext uri="{D42A27DB-BD31-4B8C-83A1-F6EECF244321}">
+                <p14:modId xmlns:p14="http://schemas.microsoft.com/office/powerpoint/2010/main" val="3922368761"/>
+              </p:ext>
+            </p:extLst>
+          </p:nvPr>
+        </p:nvGraphicFramePr>
+        <p:xfrm>
+          <a:off x="1524000" y="1397000"/>
+          <a:ext cx="6096000" cy="4064000"/>
+        </p:xfrm>
+        <a:graphic>
+          <a:graphicData uri="http://schemas.openxmlformats.org/drawingml/2006/chart">
+            <c:chart xmlns:c="http://schemas.openxmlformats.org/drawingml/2006/chart" xmlns:r="http://schemas.openxmlformats.org/officeDocument/2006/relationships" r:id="rId2"/>
+          </a:graphicData>
+        </a:graphic>
+      </p:graphicFrame>
+    </p:spTree>
+    <p:extLst>
+      <p:ext uri="{BB962C8B-B14F-4D97-AF65-F5344CB8AC3E}">
+        <p14:creationId xmlns:p14="http://schemas.microsoft.com/office/powerpoint/2010/main" val="3757447559"/>
+      </p:ext>
+    </p:extLst>
+  </p:cSld>
+  <p:clrMapOvr>
+    <a:masterClrMapping/>
+  </p:clrMapOvr>
+  <p:transition>
+    <p:fade thruBlk="1"/>
+  </p:transition>
+</p:sld>
+</file>
+
 <file path=ppt/theme/theme1.xml><?xml version="1.0" encoding="utf-8"?>
 <a:theme xmlns:a="http://schemas.openxmlformats.org/drawingml/2006/main" name="main">
   <a:themeElements>
@@ -38011,14 +38935,63 @@
 
 <file path=customXml/item1.xml><?xml version="1.0" encoding="utf-8"?>
 <?mso-contentType ?>
-<FormTemplates xmlns="http://schemas.microsoft.com/sharepoint/v3/contenttype/forms">
-  <Display>DocumentLibraryForm</Display>
-  <Edit>DocumentLibraryForm</Edit>
-  <New>DocumentLibraryForm</New>
-</FormTemplates>
+<spe:Receivers xmlns:spe="http://schemas.microsoft.com/sharepoint/events">
+  <Receiver>
+    <Name>Document ID Generator</Name>
+    <Synchronization>Synchronous</Synchronization>
+    <Type>10001</Type>
+    <SequenceNumber>1000</SequenceNumber>
+    <Assembly>Microsoft.Office.DocumentManagement, Version=14.0.0.0, Culture=neutral, PublicKeyToken=71e9bce111e9429c</Assembly>
+    <Class>Microsoft.Office.DocumentManagement.Internal.DocIdHandler</Class>
+    <Data/>
+    <Filter/>
+  </Receiver>
+  <Receiver>
+    <Name>Document ID Generator</Name>
+    <Synchronization>Synchronous</Synchronization>
+    <Type>10002</Type>
+    <SequenceNumber>1001</SequenceNumber>
+    <Assembly>Microsoft.Office.DocumentManagement, Version=14.0.0.0, Culture=neutral, PublicKeyToken=71e9bce111e9429c</Assembly>
+    <Class>Microsoft.Office.DocumentManagement.Internal.DocIdHandler</Class>
+    <Data/>
+    <Filter/>
+  </Receiver>
+  <Receiver>
+    <Name>Document ID Generator</Name>
+    <Synchronization>Synchronous</Synchronization>
+    <Type>10004</Type>
+    <SequenceNumber>1002</SequenceNumber>
+    <Assembly>Microsoft.Office.DocumentManagement, Version=14.0.0.0, Culture=neutral, PublicKeyToken=71e9bce111e9429c</Assembly>
+    <Class>Microsoft.Office.DocumentManagement.Internal.DocIdHandler</Class>
+    <Data/>
+    <Filter/>
+  </Receiver>
+  <Receiver>
+    <Name>Document ID Generator</Name>
+    <Synchronization>Synchronous</Synchronization>
+    <Type>10006</Type>
+    <SequenceNumber>1003</SequenceNumber>
+    <Assembly>Microsoft.Office.DocumentManagement, Version=14.0.0.0, Culture=neutral, PublicKeyToken=71e9bce111e9429c</Assembly>
+    <Class>Microsoft.Office.DocumentManagement.Internal.DocIdHandler</Class>
+    <Data/>
+    <Filter/>
+  </Receiver>
+</spe:Receivers>
 </file>
 
 <file path=customXml/item2.xml><?xml version="1.0" encoding="utf-8"?>
+<p:properties xmlns:p="http://schemas.microsoft.com/office/2006/metadata/properties" xmlns:xsi="http://www.w3.org/2001/XMLSchema-instance">
+  <documentManagement>
+    <_dlc_DocId xmlns="be20594f-2eea-40fe-a544-651162df1661">H5QFR5MR6HVR-191-8057</_dlc_DocId>
+    <_dlc_DocIdUrl xmlns="be20594f-2eea-40fe-a544-651162df1661">
+      <Url>http://hq-ib-spp-01:33033/dro/_layouts/DocIdRedir.aspx?ID=H5QFR5MR6HVR-191-8057</Url>
+      <Description>H5QFR5MR6HVR-191-8057</Description>
+    </_dlc_DocIdUrl>
+  </documentManagement>
+</p:properties>
+</file>
+
+<file path=customXml/item3.xml><?xml version="1.0" encoding="utf-8"?>
 <ct:contentTypeSchema xmlns:ct="http://schemas.microsoft.com/office/2006/metadata/contentType" xmlns:ma="http://schemas.microsoft.com/office/2006/metadata/properties/metaAttributes" ct:_="" ma:_="" ma:contentTypeName="Документ" ma:contentTypeID="0x01010013BB28CB4415674F8F0D138DCF9FF99E" ma:contentTypeVersion="1" ma:contentTypeDescription="Создание документа." ma:contentTypeScope="" ma:versionID="2facfc86a05a16232d395dc449f12516">
   <xsd:schema xmlns:xsd="http://www.w3.org/2001/XMLSchema" xmlns:xs="http://www.w3.org/2001/XMLSchema" xmlns:p="http://schemas.microsoft.com/office/2006/metadata/properties" xmlns:ns2="be20594f-2eea-40fe-a544-651162df1661" targetNamespace="http://schemas.microsoft.com/office/2006/metadata/properties" ma:root="true" ma:fieldsID="f6db882ae31442d98131b6bb4a517e7b" ns2:_="">
     <xsd:import namespace="be20594f-2eea-40fe-a544-651162df1661"/>
@@ -38163,73 +39136,33 @@
 </ct:contentTypeSchema>
 </file>
 
-<file path=customXml/item3.xml><?xml version="1.0" encoding="utf-8"?>
-<p:properties xmlns:p="http://schemas.microsoft.com/office/2006/metadata/properties" xmlns:xsi="http://www.w3.org/2001/XMLSchema-instance">
-  <documentManagement>
-    <_dlc_DocId xmlns="be20594f-2eea-40fe-a544-651162df1661">H5QFR5MR6HVR-191-8057</_dlc_DocId>
-    <_dlc_DocIdUrl xmlns="be20594f-2eea-40fe-a544-651162df1661">
-      <Url>http://hq-ib-spp-01:33033/dro/_layouts/DocIdRedir.aspx?ID=H5QFR5MR6HVR-191-8057</Url>
-      <Description>H5QFR5MR6HVR-191-8057</Description>
-    </_dlc_DocIdUrl>
-  </documentManagement>
-</p:properties>
-</file>
-
 <file path=customXml/item4.xml><?xml version="1.0" encoding="utf-8"?>
 <?mso-contentType ?>
-<spe:Receivers xmlns:spe="http://schemas.microsoft.com/sharepoint/events">
-  <Receiver>
-    <Name>Document ID Generator</Name>
-    <Synchronization>Synchronous</Synchronization>
-    <Type>10001</Type>
-    <SequenceNumber>1000</SequenceNumber>
-    <Assembly>Microsoft.Office.DocumentManagement, Version=14.0.0.0, Culture=neutral, PublicKeyToken=71e9bce111e9429c</Assembly>
-    <Class>Microsoft.Office.DocumentManagement.Internal.DocIdHandler</Class>
-    <Data/>
-    <Filter/>
-  </Receiver>
-  <Receiver>
-    <Name>Document ID Generator</Name>
-    <Synchronization>Synchronous</Synchronization>
-    <Type>10002</Type>
-    <SequenceNumber>1001</SequenceNumber>
-    <Assembly>Microsoft.Office.DocumentManagement, Version=14.0.0.0, Culture=neutral, PublicKeyToken=71e9bce111e9429c</Assembly>
-    <Class>Microsoft.Office.DocumentManagement.Internal.DocIdHandler</Class>
-    <Data/>
-    <Filter/>
-  </Receiver>
-  <Receiver>
-    <Name>Document ID Generator</Name>
-    <Synchronization>Synchronous</Synchronization>
-    <Type>10004</Type>
-    <SequenceNumber>1002</SequenceNumber>
-    <Assembly>Microsoft.Office.DocumentManagement, Version=14.0.0.0, Culture=neutral, PublicKeyToken=71e9bce111e9429c</Assembly>
-    <Class>Microsoft.Office.DocumentManagement.Internal.DocIdHandler</Class>
-    <Data/>
-    <Filter/>
-  </Receiver>
-  <Receiver>
-    <Name>Document ID Generator</Name>
-    <Synchronization>Synchronous</Synchronization>
-    <Type>10006</Type>
-    <SequenceNumber>1003</SequenceNumber>
-    <Assembly>Microsoft.Office.DocumentManagement, Version=14.0.0.0, Culture=neutral, PublicKeyToken=71e9bce111e9429c</Assembly>
-    <Class>Microsoft.Office.DocumentManagement.Internal.DocIdHandler</Class>
-    <Data/>
-    <Filter/>
-  </Receiver>
-</spe:Receivers>
+<FormTemplates xmlns="http://schemas.microsoft.com/sharepoint/v3/contenttype/forms">
+  <Display>DocumentLibraryForm</Display>
+  <Edit>DocumentLibraryForm</Edit>
+  <New>DocumentLibraryForm</New>
+</FormTemplates>
 </file>
 
 <file path=customXml/itemProps1.xml><?xml version="1.0" encoding="utf-8"?>
-<ds:datastoreItem xmlns:ds="http://schemas.openxmlformats.org/officeDocument/2006/customXml" ds:itemID="{7AF9CC26-3D4B-4EC2-B7DC-7D2C0FF80728}">
+<ds:datastoreItem xmlns:ds="http://schemas.openxmlformats.org/officeDocument/2006/customXml" ds:itemID="{BB683DF9-DA92-4C79-B006-5DF0F1F3DB36}">
   <ds:schemaRefs>
-    <ds:schemaRef ds:uri="http://schemas.microsoft.com/sharepoint/v3/contenttype/forms"/>
+    <ds:schemaRef ds:uri="http://schemas.microsoft.com/sharepoint/events"/>
   </ds:schemaRefs>
 </ds:datastoreItem>
 </file>
 
 <file path=customXml/itemProps2.xml><?xml version="1.0" encoding="utf-8"?>
+<ds:datastoreItem xmlns:ds="http://schemas.openxmlformats.org/officeDocument/2006/customXml" ds:itemID="{F66065F5-54B1-4A17-A77F-B02525987614}">
+  <ds:schemaRefs>
+    <ds:schemaRef ds:uri="http://schemas.microsoft.com/office/2006/metadata/properties"/>
+    <ds:schemaRef ds:uri="be20594f-2eea-40fe-a544-651162df1661"/>
+  </ds:schemaRefs>
+</ds:datastoreItem>
+</file>
+
+<file path=customXml/itemProps3.xml><?xml version="1.0" encoding="utf-8"?>
 <ds:datastoreItem xmlns:ds="http://schemas.openxmlformats.org/officeDocument/2006/customXml" ds:itemID="{C1DFF616-BAC0-4B3A-B88E-78A029C189EA}">
   <ds:schemaRefs>
     <ds:schemaRef ds:uri="http://schemas.microsoft.com/office/2006/metadata/contentType"/>
@@ -38247,19 +39180,10 @@
 </ds:datastoreItem>
 </file>
 
-<file path=customXml/itemProps3.xml><?xml version="1.0" encoding="utf-8"?>
-<ds:datastoreItem xmlns:ds="http://schemas.openxmlformats.org/officeDocument/2006/customXml" ds:itemID="{F66065F5-54B1-4A17-A77F-B02525987614}">
+<file path=customXml/itemProps4.xml><?xml version="1.0" encoding="utf-8"?>
+<ds:datastoreItem xmlns:ds="http://schemas.openxmlformats.org/officeDocument/2006/customXml" ds:itemID="{7AF9CC26-3D4B-4EC2-B7DC-7D2C0FF80728}">
   <ds:schemaRefs>
-    <ds:schemaRef ds:uri="http://schemas.microsoft.com/office/2006/metadata/properties"/>
-    <ds:schemaRef ds:uri="be20594f-2eea-40fe-a544-651162df1661"/>
-  </ds:schemaRefs>
-</ds:datastoreItem>
-</file>
-
-<file path=customXml/itemProps4.xml><?xml version="1.0" encoding="utf-8"?>
-<ds:datastoreItem xmlns:ds="http://schemas.openxmlformats.org/officeDocument/2006/customXml" ds:itemID="{BB683DF9-DA92-4C79-B006-5DF0F1F3DB36}">
-  <ds:schemaRefs>
-    <ds:schemaRef ds:uri="http://schemas.microsoft.com/sharepoint/events"/>
+    <ds:schemaRef ds:uri="http://schemas.microsoft.com/sharepoint/v3/contenttype/forms"/>
   </ds:schemaRefs>
 </ds:datastoreItem>
 </file>
</xml_diff>